<commit_message>
updating the slide deck
</commit_message>
<xml_diff>
--- a/roltv.pptx
+++ b/roltv.pptx
@@ -8,15 +8,18 @@
     <p:sldId id="256" r:id="rId2"/>
     <p:sldId id="257" r:id="rId3"/>
     <p:sldId id="258" r:id="rId4"/>
-    <p:sldId id="259" r:id="rId5"/>
-    <p:sldId id="260" r:id="rId6"/>
-    <p:sldId id="262" r:id="rId7"/>
-    <p:sldId id="263" r:id="rId8"/>
-    <p:sldId id="264" r:id="rId9"/>
-    <p:sldId id="265" r:id="rId10"/>
-    <p:sldId id="266" r:id="rId11"/>
-    <p:sldId id="267" r:id="rId12"/>
-    <p:sldId id="261" r:id="rId13"/>
+    <p:sldId id="268" r:id="rId5"/>
+    <p:sldId id="259" r:id="rId6"/>
+    <p:sldId id="270" r:id="rId7"/>
+    <p:sldId id="271" r:id="rId8"/>
+    <p:sldId id="260" r:id="rId9"/>
+    <p:sldId id="262" r:id="rId10"/>
+    <p:sldId id="263" r:id="rId11"/>
+    <p:sldId id="264" r:id="rId12"/>
+    <p:sldId id="265" r:id="rId13"/>
+    <p:sldId id="266" r:id="rId14"/>
+    <p:sldId id="267" r:id="rId15"/>
+    <p:sldId id="261" r:id="rId16"/>
   </p:sldIdLst>
   <p:sldSz cx="12192000" cy="6858000"/>
   <p:notesSz cx="6858000" cy="9144000"/>
@@ -123,7 +126,10 @@
             <p14:sldId id="256"/>
             <p14:sldId id="257"/>
             <p14:sldId id="258"/>
+            <p14:sldId id="268"/>
             <p14:sldId id="259"/>
+            <p14:sldId id="270"/>
+            <p14:sldId id="271"/>
             <p14:sldId id="260"/>
             <p14:sldId id="262"/>
             <p14:sldId id="263"/>
@@ -171,6 +177,34 @@
 
 <file path=ppt/comments/comment2.xml><?xml version="1.0" encoding="utf-8"?>
 <p:cmLst xmlns:a="http://schemas.openxmlformats.org/drawingml/2006/main" xmlns:r="http://schemas.openxmlformats.org/officeDocument/2006/relationships" xmlns:p="http://schemas.openxmlformats.org/presentationml/2006/main">
+  <p:cm authorId="1" dt="2018-07-17T23:20:47.069" idx="1">
+    <p:pos x="10" y="10"/>
+    <p:text>goto the web link and show the web api on detect.</p:text>
+    <p:extLst>
+      <p:ext uri="{C676402C-5697-4E1C-873F-D02D1690AC5C}">
+        <p15:threadingInfo xmlns:p15="http://schemas.microsoft.com/office/powerpoint/2012/main" timeZoneBias="300"/>
+      </p:ext>
+    </p:extLst>
+  </p:cm>
+</p:cmLst>
+</file>
+
+<file path=ppt/comments/comment3.xml><?xml version="1.0" encoding="utf-8"?>
+<p:cmLst xmlns:a="http://schemas.openxmlformats.org/drawingml/2006/main" xmlns:r="http://schemas.openxmlformats.org/officeDocument/2006/relationships" xmlns:p="http://schemas.openxmlformats.org/presentationml/2006/main">
+  <p:cm authorId="1" dt="2018-07-17T23:20:47.069" idx="1">
+    <p:pos x="10" y="10"/>
+    <p:text>goto the web link and show the web api on detect.</p:text>
+    <p:extLst>
+      <p:ext uri="{C676402C-5697-4E1C-873F-D02D1690AC5C}">
+        <p15:threadingInfo xmlns:p15="http://schemas.microsoft.com/office/powerpoint/2012/main" timeZoneBias="300"/>
+      </p:ext>
+    </p:extLst>
+  </p:cm>
+</p:cmLst>
+</file>
+
+<file path=ppt/comments/comment4.xml><?xml version="1.0" encoding="utf-8"?>
+<p:cmLst xmlns:a="http://schemas.openxmlformats.org/drawingml/2006/main" xmlns:r="http://schemas.openxmlformats.org/officeDocument/2006/relationships" xmlns:p="http://schemas.openxmlformats.org/presentationml/2006/main">
   <p:cm authorId="1" dt="2018-07-17T23:23:33.553" idx="2">
     <p:pos x="4066" y="407"/>
     <p:text>Show the JSON</p:text>
@@ -192,7 +226,7 @@
 </p:cmLst>
 </file>
 
-<file path=ppt/comments/comment3.xml><?xml version="1.0" encoding="utf-8"?>
+<file path=ppt/comments/comment5.xml><?xml version="1.0" encoding="utf-8"?>
 <p:cmLst xmlns:a="http://schemas.openxmlformats.org/drawingml/2006/main" xmlns:r="http://schemas.openxmlformats.org/officeDocument/2006/relationships" xmlns:p="http://schemas.openxmlformats.org/presentationml/2006/main">
   <p:cm authorId="1" dt="2018-07-17T23:26:56.457" idx="4">
     <p:pos x="10" y="10"/>
@@ -5967,6 +6001,36 @@
           </a:p>
         </p:txBody>
       </p:sp>
+      <p:pic>
+        <p:nvPicPr>
+          <p:cNvPr id="5" name="Picture 4">
+            <a:extLst>
+              <a:ext uri="{FF2B5EF4-FFF2-40B4-BE49-F238E27FC236}">
+                <a16:creationId xmlns:a16="http://schemas.microsoft.com/office/drawing/2014/main" id="{3D3665C7-F30D-430A-81FF-938A29488DD4}"/>
+              </a:ext>
+            </a:extLst>
+          </p:cNvPr>
+          <p:cNvPicPr>
+            <a:picLocks noChangeAspect="1"/>
+          </p:cNvPicPr>
+          <p:nvPr/>
+        </p:nvPicPr>
+        <p:blipFill>
+          <a:blip r:embed="rId2"/>
+          <a:stretch>
+            <a:fillRect/>
+          </a:stretch>
+        </p:blipFill>
+        <p:spPr>
+          <a:xfrm>
+            <a:off x="1784472" y="2476493"/>
+            <a:ext cx="1905014" cy="1905014"/>
+          </a:xfrm>
+          <a:prstGeom prst="rect">
+            <a:avLst/>
+          </a:prstGeom>
+        </p:spPr>
+      </p:pic>
     </p:spTree>
     <p:extLst>
       <p:ext uri="{BB962C8B-B14F-4D97-AF65-F5344CB8AC3E}">
@@ -6002,7 +6066,7 @@
           <p:cNvPr id="2" name="Title 1">
             <a:extLst>
               <a:ext uri="{FF2B5EF4-FFF2-40B4-BE49-F238E27FC236}">
-                <a16:creationId xmlns:a16="http://schemas.microsoft.com/office/drawing/2014/main" id="{EAA96D82-581E-4F8D-A0AB-51A17935D779}"/>
+                <a16:creationId xmlns:a16="http://schemas.microsoft.com/office/drawing/2014/main" id="{99172343-CBFD-4DA1-8240-173467B0E5D1}"/>
               </a:ext>
             </a:extLst>
           </p:cNvPr>
@@ -6018,7 +6082,10 @@
           <a:bodyPr/>
           <a:lstStyle/>
           <a:p>
-            <a:endParaRPr lang="en-US"/>
+            <a:r>
+              <a:rPr lang="en-US" dirty="0"/>
+              <a:t>How many overlord coin does this cost?</a:t>
+            </a:r>
           </a:p>
         </p:txBody>
       </p:sp>
@@ -6027,7 +6094,7 @@
           <p:cNvPr id="3" name="Content Placeholder 2">
             <a:extLst>
               <a:ext uri="{FF2B5EF4-FFF2-40B4-BE49-F238E27FC236}">
-                <a16:creationId xmlns:a16="http://schemas.microsoft.com/office/drawing/2014/main" id="{7E847610-FC94-40D9-A36F-1585F2FD3E16}"/>
+                <a16:creationId xmlns:a16="http://schemas.microsoft.com/office/drawing/2014/main" id="{46CD42C3-9D1A-46EB-991D-0C75907316B1}"/>
               </a:ext>
             </a:extLst>
           </p:cNvPr>
@@ -6038,19 +6105,29 @@
             <p:ph idx="1"/>
           </p:nvPr>
         </p:nvSpPr>
-        <p:spPr/>
-        <p:txBody>
-          <a:bodyPr/>
-          <a:lstStyle/>
-          <a:p>
-            <a:endParaRPr lang="en-US"/>
+        <p:spPr>
+          <a:xfrm>
+            <a:off x="677334" y="1421000"/>
+            <a:ext cx="8596668" cy="4361235"/>
+          </a:xfrm>
+        </p:spPr>
+        <p:txBody>
+          <a:bodyPr>
+            <a:normAutofit/>
+          </a:bodyPr>
+          <a:lstStyle/>
+          <a:p>
+            <a:pPr marL="0" indent="0">
+              <a:buNone/>
+            </a:pPr>
+            <a:endParaRPr lang="en-US" dirty="0"/>
           </a:p>
         </p:txBody>
       </p:sp>
     </p:spTree>
     <p:extLst>
       <p:ext uri="{BB962C8B-B14F-4D97-AF65-F5344CB8AC3E}">
-        <p14:creationId xmlns:p14="http://schemas.microsoft.com/office/powerpoint/2010/main" val="2030937476"/>
+        <p14:creationId xmlns:p14="http://schemas.microsoft.com/office/powerpoint/2010/main" val="2731125121"/>
       </p:ext>
     </p:extLst>
   </p:cSld>
@@ -6082,7 +6159,7 @@
           <p:cNvPr id="2" name="Title 1">
             <a:extLst>
               <a:ext uri="{FF2B5EF4-FFF2-40B4-BE49-F238E27FC236}">
-                <a16:creationId xmlns:a16="http://schemas.microsoft.com/office/drawing/2014/main" id="{A19033E1-98CE-41E4-AD3C-E67779FD907E}"/>
+                <a16:creationId xmlns:a16="http://schemas.microsoft.com/office/drawing/2014/main" id="{F4404C3F-FE5D-4E7D-ABD4-165D7238D802}"/>
               </a:ext>
             </a:extLst>
           </p:cNvPr>
@@ -6100,7 +6177,7 @@
           <a:p>
             <a:r>
               <a:rPr lang="en-US" dirty="0"/>
-              <a:t>So where is the robot…</a:t>
+              <a:t>You sold me, so how to get started!</a:t>
             </a:r>
           </a:p>
         </p:txBody>
@@ -6110,7 +6187,7 @@
           <p:cNvPr id="3" name="Content Placeholder 2">
             <a:extLst>
               <a:ext uri="{FF2B5EF4-FFF2-40B4-BE49-F238E27FC236}">
-                <a16:creationId xmlns:a16="http://schemas.microsoft.com/office/drawing/2014/main" id="{B7FA68D7-3B83-41EA-BDB0-2B9A9567DDDD}"/>
+                <a16:creationId xmlns:a16="http://schemas.microsoft.com/office/drawing/2014/main" id="{5749BDC7-1332-4143-9AF8-D0C420ADC9AD}"/>
               </a:ext>
             </a:extLst>
           </p:cNvPr>
@@ -6126,14 +6203,26 @@
           <a:bodyPr/>
           <a:lstStyle/>
           <a:p>
-            <a:endParaRPr lang="en-US"/>
+            <a:r>
+              <a:rPr lang="en-US" dirty="0"/>
+              <a:t>Azure</a:t>
+            </a:r>
+          </a:p>
+          <a:p>
+            <a:r>
+              <a:rPr lang="en-US" dirty="0"/>
+              <a:t>Then follow through the steps on the detect and recognize….</a:t>
+            </a:r>
+          </a:p>
+          <a:p>
+            <a:endParaRPr lang="en-US" dirty="0"/>
           </a:p>
         </p:txBody>
       </p:sp>
     </p:spTree>
     <p:extLst>
       <p:ext uri="{BB962C8B-B14F-4D97-AF65-F5344CB8AC3E}">
-        <p14:creationId xmlns:p14="http://schemas.microsoft.com/office/powerpoint/2010/main" val="445193679"/>
+        <p14:creationId xmlns:p14="http://schemas.microsoft.com/office/powerpoint/2010/main" val="3422128026"/>
       </p:ext>
     </p:extLst>
   </p:cSld>
@@ -6165,6 +6254,252 @@
           <p:cNvPr id="2" name="Title 1">
             <a:extLst>
               <a:ext uri="{FF2B5EF4-FFF2-40B4-BE49-F238E27FC236}">
+                <a16:creationId xmlns:a16="http://schemas.microsoft.com/office/drawing/2014/main" id="{996EF56D-7AE3-495F-B423-0646A6864B3B}"/>
+              </a:ext>
+            </a:extLst>
+          </p:cNvPr>
+          <p:cNvSpPr>
+            <a:spLocks noGrp="1"/>
+          </p:cNvSpPr>
+          <p:nvPr>
+            <p:ph type="title"/>
+          </p:nvPr>
+        </p:nvSpPr>
+        <p:spPr/>
+        <p:txBody>
+          <a:bodyPr/>
+          <a:lstStyle/>
+          <a:p>
+            <a:r>
+              <a:rPr lang="en-US" dirty="0"/>
+              <a:t>Demos!!!!!!!</a:t>
+            </a:r>
+          </a:p>
+        </p:txBody>
+      </p:sp>
+      <p:sp>
+        <p:nvSpPr>
+          <p:cNvPr id="3" name="Content Placeholder 2">
+            <a:extLst>
+              <a:ext uri="{FF2B5EF4-FFF2-40B4-BE49-F238E27FC236}">
+                <a16:creationId xmlns:a16="http://schemas.microsoft.com/office/drawing/2014/main" id="{571BA0E3-97E8-4BEC-9ECC-0C9AC85A3E74}"/>
+              </a:ext>
+            </a:extLst>
+          </p:cNvPr>
+          <p:cNvSpPr>
+            <a:spLocks noGrp="1"/>
+          </p:cNvSpPr>
+          <p:nvPr>
+            <p:ph idx="1"/>
+          </p:nvPr>
+        </p:nvSpPr>
+        <p:spPr/>
+        <p:txBody>
+          <a:bodyPr/>
+          <a:lstStyle/>
+          <a:p>
+            <a:endParaRPr lang="en-US"/>
+          </a:p>
+        </p:txBody>
+      </p:sp>
+    </p:spTree>
+    <p:extLst>
+      <p:ext uri="{BB962C8B-B14F-4D97-AF65-F5344CB8AC3E}">
+        <p14:creationId xmlns:p14="http://schemas.microsoft.com/office/powerpoint/2010/main" val="2096994649"/>
+      </p:ext>
+    </p:extLst>
+  </p:cSld>
+  <p:clrMapOvr>
+    <a:masterClrMapping/>
+  </p:clrMapOvr>
+</p:sld>
+</file>
+
+<file path=ppt/slides/slide13.xml><?xml version="1.0" encoding="utf-8"?>
+<p:sld xmlns:a="http://schemas.openxmlformats.org/drawingml/2006/main" xmlns:r="http://schemas.openxmlformats.org/officeDocument/2006/relationships" xmlns:p="http://schemas.openxmlformats.org/presentationml/2006/main">
+  <p:cSld>
+    <p:spTree>
+      <p:nvGrpSpPr>
+        <p:cNvPr id="1" name=""/>
+        <p:cNvGrpSpPr/>
+        <p:nvPr/>
+      </p:nvGrpSpPr>
+      <p:grpSpPr>
+        <a:xfrm>
+          <a:off x="0" y="0"/>
+          <a:ext cx="0" cy="0"/>
+          <a:chOff x="0" y="0"/>
+          <a:chExt cx="0" cy="0"/>
+        </a:xfrm>
+      </p:grpSpPr>
+      <p:sp>
+        <p:nvSpPr>
+          <p:cNvPr id="2" name="Title 1">
+            <a:extLst>
+              <a:ext uri="{FF2B5EF4-FFF2-40B4-BE49-F238E27FC236}">
+                <a16:creationId xmlns:a16="http://schemas.microsoft.com/office/drawing/2014/main" id="{EAA96D82-581E-4F8D-A0AB-51A17935D779}"/>
+              </a:ext>
+            </a:extLst>
+          </p:cNvPr>
+          <p:cNvSpPr>
+            <a:spLocks noGrp="1"/>
+          </p:cNvSpPr>
+          <p:nvPr>
+            <p:ph type="title"/>
+          </p:nvPr>
+        </p:nvSpPr>
+        <p:spPr/>
+        <p:txBody>
+          <a:bodyPr/>
+          <a:lstStyle/>
+          <a:p>
+            <a:endParaRPr lang="en-US"/>
+          </a:p>
+        </p:txBody>
+      </p:sp>
+      <p:sp>
+        <p:nvSpPr>
+          <p:cNvPr id="3" name="Content Placeholder 2">
+            <a:extLst>
+              <a:ext uri="{FF2B5EF4-FFF2-40B4-BE49-F238E27FC236}">
+                <a16:creationId xmlns:a16="http://schemas.microsoft.com/office/drawing/2014/main" id="{7E847610-FC94-40D9-A36F-1585F2FD3E16}"/>
+              </a:ext>
+            </a:extLst>
+          </p:cNvPr>
+          <p:cNvSpPr>
+            <a:spLocks noGrp="1"/>
+          </p:cNvSpPr>
+          <p:nvPr>
+            <p:ph idx="1"/>
+          </p:nvPr>
+        </p:nvSpPr>
+        <p:spPr/>
+        <p:txBody>
+          <a:bodyPr/>
+          <a:lstStyle/>
+          <a:p>
+            <a:endParaRPr lang="en-US"/>
+          </a:p>
+        </p:txBody>
+      </p:sp>
+    </p:spTree>
+    <p:extLst>
+      <p:ext uri="{BB962C8B-B14F-4D97-AF65-F5344CB8AC3E}">
+        <p14:creationId xmlns:p14="http://schemas.microsoft.com/office/powerpoint/2010/main" val="2030937476"/>
+      </p:ext>
+    </p:extLst>
+  </p:cSld>
+  <p:clrMapOvr>
+    <a:masterClrMapping/>
+  </p:clrMapOvr>
+</p:sld>
+</file>
+
+<file path=ppt/slides/slide14.xml><?xml version="1.0" encoding="utf-8"?>
+<p:sld xmlns:a="http://schemas.openxmlformats.org/drawingml/2006/main" xmlns:r="http://schemas.openxmlformats.org/officeDocument/2006/relationships" xmlns:p="http://schemas.openxmlformats.org/presentationml/2006/main">
+  <p:cSld>
+    <p:spTree>
+      <p:nvGrpSpPr>
+        <p:cNvPr id="1" name=""/>
+        <p:cNvGrpSpPr/>
+        <p:nvPr/>
+      </p:nvGrpSpPr>
+      <p:grpSpPr>
+        <a:xfrm>
+          <a:off x="0" y="0"/>
+          <a:ext cx="0" cy="0"/>
+          <a:chOff x="0" y="0"/>
+          <a:chExt cx="0" cy="0"/>
+        </a:xfrm>
+      </p:grpSpPr>
+      <p:sp>
+        <p:nvSpPr>
+          <p:cNvPr id="2" name="Title 1">
+            <a:extLst>
+              <a:ext uri="{FF2B5EF4-FFF2-40B4-BE49-F238E27FC236}">
+                <a16:creationId xmlns:a16="http://schemas.microsoft.com/office/drawing/2014/main" id="{A19033E1-98CE-41E4-AD3C-E67779FD907E}"/>
+              </a:ext>
+            </a:extLst>
+          </p:cNvPr>
+          <p:cNvSpPr>
+            <a:spLocks noGrp="1"/>
+          </p:cNvSpPr>
+          <p:nvPr>
+            <p:ph type="title"/>
+          </p:nvPr>
+        </p:nvSpPr>
+        <p:spPr/>
+        <p:txBody>
+          <a:bodyPr/>
+          <a:lstStyle/>
+          <a:p>
+            <a:r>
+              <a:rPr lang="en-US" dirty="0"/>
+              <a:t>So where is the robot…</a:t>
+            </a:r>
+          </a:p>
+        </p:txBody>
+      </p:sp>
+      <p:sp>
+        <p:nvSpPr>
+          <p:cNvPr id="3" name="Content Placeholder 2">
+            <a:extLst>
+              <a:ext uri="{FF2B5EF4-FFF2-40B4-BE49-F238E27FC236}">
+                <a16:creationId xmlns:a16="http://schemas.microsoft.com/office/drawing/2014/main" id="{B7FA68D7-3B83-41EA-BDB0-2B9A9567DDDD}"/>
+              </a:ext>
+            </a:extLst>
+          </p:cNvPr>
+          <p:cNvSpPr>
+            <a:spLocks noGrp="1"/>
+          </p:cNvSpPr>
+          <p:nvPr>
+            <p:ph idx="1"/>
+          </p:nvPr>
+        </p:nvSpPr>
+        <p:spPr/>
+        <p:txBody>
+          <a:bodyPr/>
+          <a:lstStyle/>
+          <a:p>
+            <a:endParaRPr lang="en-US"/>
+          </a:p>
+        </p:txBody>
+      </p:sp>
+    </p:spTree>
+    <p:extLst>
+      <p:ext uri="{BB962C8B-B14F-4D97-AF65-F5344CB8AC3E}">
+        <p14:creationId xmlns:p14="http://schemas.microsoft.com/office/powerpoint/2010/main" val="445193679"/>
+      </p:ext>
+    </p:extLst>
+  </p:cSld>
+  <p:clrMapOvr>
+    <a:masterClrMapping/>
+  </p:clrMapOvr>
+</p:sld>
+</file>
+
+<file path=ppt/slides/slide15.xml><?xml version="1.0" encoding="utf-8"?>
+<p:sld xmlns:a="http://schemas.openxmlformats.org/drawingml/2006/main" xmlns:r="http://schemas.openxmlformats.org/officeDocument/2006/relationships" xmlns:p="http://schemas.openxmlformats.org/presentationml/2006/main">
+  <p:cSld>
+    <p:spTree>
+      <p:nvGrpSpPr>
+        <p:cNvPr id="1" name=""/>
+        <p:cNvGrpSpPr/>
+        <p:nvPr/>
+      </p:nvGrpSpPr>
+      <p:grpSpPr>
+        <a:xfrm>
+          <a:off x="0" y="0"/>
+          <a:ext cx="0" cy="0"/>
+          <a:chOff x="0" y="0"/>
+          <a:chExt cx="0" cy="0"/>
+        </a:xfrm>
+      </p:grpSpPr>
+      <p:sp>
+        <p:nvSpPr>
+          <p:cNvPr id="2" name="Title 1">
+            <a:extLst>
+              <a:ext uri="{FF2B5EF4-FFF2-40B4-BE49-F238E27FC236}">
                 <a16:creationId xmlns:a16="http://schemas.microsoft.com/office/drawing/2014/main" id="{B8D5D137-925C-45CF-B389-8C9930A70B77}"/>
               </a:ext>
             </a:extLst>
@@ -6269,6 +6604,12 @@
               <a:t>http://bit.ly/web-face-api</a:t>
             </a:r>
             <a:endParaRPr lang="en-US" sz="2400" dirty="0"/>
+          </a:p>
+          <a:p>
+            <a:r>
+              <a:rPr lang="en-US" sz="2400" dirty="0"/>
+              <a:t>Glossary: http://bit.ly/face-api-glossary</a:t>
+            </a:r>
           </a:p>
           <a:p>
             <a:endParaRPr lang="en-US" dirty="0"/>
@@ -6621,7 +6962,7 @@
           <p:cNvPr id="2" name="Title 1">
             <a:extLst>
               <a:ext uri="{FF2B5EF4-FFF2-40B4-BE49-F238E27FC236}">
-                <a16:creationId xmlns:a16="http://schemas.microsoft.com/office/drawing/2014/main" id="{D99928D2-3943-4923-B91D-2B64861710A0}"/>
+                <a16:creationId xmlns:a16="http://schemas.microsoft.com/office/drawing/2014/main" id="{7A019825-B40C-4333-AD10-872ABD6A26AE}"/>
               </a:ext>
             </a:extLst>
           </p:cNvPr>
@@ -6639,7 +6980,7 @@
           <a:p>
             <a:r>
               <a:rPr lang="en-US" dirty="0"/>
-              <a:t>Can the Overlord recognize me?</a:t>
+              <a:t>Overlords can be sneaky…</a:t>
             </a:r>
           </a:p>
         </p:txBody>
@@ -6649,7 +6990,7 @@
           <p:cNvPr id="3" name="Content Placeholder 2">
             <a:extLst>
               <a:ext uri="{FF2B5EF4-FFF2-40B4-BE49-F238E27FC236}">
-                <a16:creationId xmlns:a16="http://schemas.microsoft.com/office/drawing/2014/main" id="{330C8428-34EE-40B8-BFAF-DAAB7EFEB228}"/>
+                <a16:creationId xmlns:a16="http://schemas.microsoft.com/office/drawing/2014/main" id="{10B73D76-F1A2-47D1-8729-BE3D173FAC11}"/>
               </a:ext>
             </a:extLst>
           </p:cNvPr>
@@ -6662,17 +7003,43 @@
         </p:nvSpPr>
         <p:spPr>
           <a:xfrm>
-            <a:off x="677334" y="2160589"/>
-            <a:ext cx="8596668" cy="642769"/>
+            <a:off x="2362698" y="2073977"/>
+            <a:ext cx="6283760" cy="3479658"/>
           </a:xfrm>
         </p:spPr>
         <p:txBody>
-          <a:bodyPr/>
-          <a:lstStyle/>
-          <a:p>
-            <a:r>
-              <a:rPr lang="en-US" dirty="0"/>
-              <a:t>The Face API provides 2 main functions: Detection and Recognition</a:t>
+          <a:bodyPr>
+            <a:noAutofit/>
+          </a:bodyPr>
+          <a:lstStyle/>
+          <a:p>
+            <a:r>
+              <a:rPr lang="en-US" sz="3600" dirty="0"/>
+              <a:t>Intelligent Kiosks</a:t>
+            </a:r>
+          </a:p>
+          <a:p>
+            <a:r>
+              <a:rPr lang="en-US" sz="3600" dirty="0"/>
+              <a:t>Security Monitoring</a:t>
+            </a:r>
+          </a:p>
+          <a:p>
+            <a:r>
+              <a:rPr lang="en-US" sz="3600" dirty="0"/>
+              <a:t>Mood monitoring</a:t>
+            </a:r>
+          </a:p>
+          <a:p>
+            <a:r>
+              <a:rPr lang="en-US" sz="3600" dirty="0"/>
+              <a:t>Attention Monitoring</a:t>
+            </a:r>
+          </a:p>
+          <a:p>
+            <a:r>
+              <a:rPr lang="en-US" sz="3600" dirty="0"/>
+              <a:t>And the list goes on….</a:t>
             </a:r>
           </a:p>
         </p:txBody>
@@ -6680,7 +7047,7 @@
     </p:spTree>
     <p:extLst>
       <p:ext uri="{BB962C8B-B14F-4D97-AF65-F5344CB8AC3E}">
-        <p14:creationId xmlns:p14="http://schemas.microsoft.com/office/powerpoint/2010/main" val="321202742"/>
+        <p14:creationId xmlns:p14="http://schemas.microsoft.com/office/powerpoint/2010/main" val="972091643"/>
       </p:ext>
     </p:extLst>
   </p:cSld>
@@ -6712,7 +7079,7 @@
           <p:cNvPr id="2" name="Title 1">
             <a:extLst>
               <a:ext uri="{FF2B5EF4-FFF2-40B4-BE49-F238E27FC236}">
-                <a16:creationId xmlns:a16="http://schemas.microsoft.com/office/drawing/2014/main" id="{169051D7-593E-4754-9C3B-844451951B58}"/>
+                <a16:creationId xmlns:a16="http://schemas.microsoft.com/office/drawing/2014/main" id="{D99928D2-3943-4923-B91D-2B64861710A0}"/>
               </a:ext>
             </a:extLst>
           </p:cNvPr>
@@ -6730,7 +7097,7 @@
           <a:p>
             <a:r>
               <a:rPr lang="en-US" dirty="0"/>
-              <a:t>What really are they tracking?</a:t>
+              <a:t>What can of things can the Overlords do?</a:t>
             </a:r>
           </a:p>
         </p:txBody>
@@ -6740,7 +7107,7 @@
           <p:cNvPr id="3" name="Content Placeholder 2">
             <a:extLst>
               <a:ext uri="{FF2B5EF4-FFF2-40B4-BE49-F238E27FC236}">
-                <a16:creationId xmlns:a16="http://schemas.microsoft.com/office/drawing/2014/main" id="{8B2CED26-AFCF-4802-8969-83F1930C4B22}"/>
+                <a16:creationId xmlns:a16="http://schemas.microsoft.com/office/drawing/2014/main" id="{330C8428-34EE-40B8-BFAF-DAAB7EFEB228}"/>
               </a:ext>
             </a:extLst>
           </p:cNvPr>
@@ -6751,22 +7118,62 @@
             <p:ph idx="1"/>
           </p:nvPr>
         </p:nvSpPr>
-        <p:spPr/>
-        <p:txBody>
-          <a:bodyPr/>
-          <a:lstStyle/>
-          <a:p>
-            <a:r>
-              <a:rPr lang="en-US" dirty="0"/>
-              <a:t>Picture of the face with the marking.</a:t>
-            </a:r>
-          </a:p>
-        </p:txBody>
-      </p:sp>
+        <p:spPr>
+          <a:xfrm>
+            <a:off x="3584147" y="1930400"/>
+            <a:ext cx="2511853" cy="784317"/>
+          </a:xfrm>
+        </p:spPr>
+        <p:txBody>
+          <a:bodyPr>
+            <a:noAutofit/>
+          </a:bodyPr>
+          <a:lstStyle/>
+          <a:p>
+            <a:pPr marL="0" indent="0">
+              <a:buNone/>
+            </a:pPr>
+            <a:r>
+              <a:rPr lang="en-US" sz="3600" dirty="0"/>
+              <a:t>Detection</a:t>
+            </a:r>
+          </a:p>
+        </p:txBody>
+      </p:sp>
+      <p:pic>
+        <p:nvPicPr>
+          <p:cNvPr id="5" name="Picture 4">
+            <a:extLst>
+              <a:ext uri="{FF2B5EF4-FFF2-40B4-BE49-F238E27FC236}">
+                <a16:creationId xmlns:a16="http://schemas.microsoft.com/office/drawing/2014/main" id="{11F7DCD4-07F4-478E-8B34-40E1F3ADB054}"/>
+              </a:ext>
+            </a:extLst>
+          </p:cNvPr>
+          <p:cNvPicPr>
+            <a:picLocks noChangeAspect="1"/>
+          </p:cNvPicPr>
+          <p:nvPr/>
+        </p:nvPicPr>
+        <p:blipFill>
+          <a:blip r:embed="rId2"/>
+          <a:stretch>
+            <a:fillRect/>
+          </a:stretch>
+        </p:blipFill>
+        <p:spPr>
+          <a:xfrm>
+            <a:off x="2077823" y="3052483"/>
+            <a:ext cx="5524500" cy="2533650"/>
+          </a:xfrm>
+          <a:prstGeom prst="rect">
+            <a:avLst/>
+          </a:prstGeom>
+        </p:spPr>
+      </p:pic>
     </p:spTree>
     <p:extLst>
       <p:ext uri="{BB962C8B-B14F-4D97-AF65-F5344CB8AC3E}">
-        <p14:creationId xmlns:p14="http://schemas.microsoft.com/office/powerpoint/2010/main" val="840592331"/>
+        <p14:creationId xmlns:p14="http://schemas.microsoft.com/office/powerpoint/2010/main" val="321202742"/>
       </p:ext>
     </p:extLst>
   </p:cSld>
@@ -6798,7 +7205,7 @@
           <p:cNvPr id="2" name="Title 1">
             <a:extLst>
               <a:ext uri="{FF2B5EF4-FFF2-40B4-BE49-F238E27FC236}">
-                <a16:creationId xmlns:a16="http://schemas.microsoft.com/office/drawing/2014/main" id="{EBBB8782-3F3D-47EE-849B-408F0CC020F7}"/>
+                <a16:creationId xmlns:a16="http://schemas.microsoft.com/office/drawing/2014/main" id="{D99928D2-3943-4923-B91D-2B64861710A0}"/>
               </a:ext>
             </a:extLst>
           </p:cNvPr>
@@ -6816,7 +7223,7 @@
           <a:p>
             <a:r>
               <a:rPr lang="en-US" dirty="0"/>
-              <a:t>What types of info can I get</a:t>
+              <a:t>What can of things can the Overlords do?</a:t>
             </a:r>
           </a:p>
         </p:txBody>
@@ -6826,7 +7233,7 @@
           <p:cNvPr id="3" name="Content Placeholder 2">
             <a:extLst>
               <a:ext uri="{FF2B5EF4-FFF2-40B4-BE49-F238E27FC236}">
-                <a16:creationId xmlns:a16="http://schemas.microsoft.com/office/drawing/2014/main" id="{5B8E7E84-BFC2-4DDB-B631-E0A5864C0A2C}"/>
+                <a16:creationId xmlns:a16="http://schemas.microsoft.com/office/drawing/2014/main" id="{330C8428-34EE-40B8-BFAF-DAAB7EFEB228}"/>
               </a:ext>
             </a:extLst>
           </p:cNvPr>
@@ -6837,19 +7244,92 @@
             <p:ph idx="1"/>
           </p:nvPr>
         </p:nvSpPr>
-        <p:spPr/>
-        <p:txBody>
-          <a:bodyPr/>
-          <a:lstStyle/>
-          <a:p>
-            <a:endParaRPr lang="en-US"/>
-          </a:p>
-        </p:txBody>
-      </p:sp>
+        <p:spPr>
+          <a:xfrm>
+            <a:off x="3598718" y="1426547"/>
+            <a:ext cx="2753900" cy="703635"/>
+          </a:xfrm>
+        </p:spPr>
+        <p:txBody>
+          <a:bodyPr>
+            <a:noAutofit/>
+          </a:bodyPr>
+          <a:lstStyle/>
+          <a:p>
+            <a:pPr marL="0" indent="0">
+              <a:buNone/>
+            </a:pPr>
+            <a:r>
+              <a:rPr lang="en-US" sz="3600" dirty="0"/>
+              <a:t>Verification</a:t>
+            </a:r>
+          </a:p>
+        </p:txBody>
+      </p:sp>
+      <p:pic>
+        <p:nvPicPr>
+          <p:cNvPr id="5" name="Picture 4">
+            <a:extLst>
+              <a:ext uri="{FF2B5EF4-FFF2-40B4-BE49-F238E27FC236}">
+                <a16:creationId xmlns:a16="http://schemas.microsoft.com/office/drawing/2014/main" id="{565129A7-F4B3-447F-868C-8B342A05E293}"/>
+              </a:ext>
+            </a:extLst>
+          </p:cNvPr>
+          <p:cNvPicPr>
+            <a:picLocks noChangeAspect="1"/>
+          </p:cNvPicPr>
+          <p:nvPr/>
+        </p:nvPicPr>
+        <p:blipFill>
+          <a:blip r:embed="rId2"/>
+          <a:stretch>
+            <a:fillRect/>
+          </a:stretch>
+        </p:blipFill>
+        <p:spPr>
+          <a:xfrm>
+            <a:off x="485192" y="2379638"/>
+            <a:ext cx="9274002" cy="2098723"/>
+          </a:xfrm>
+          <a:prstGeom prst="rect">
+            <a:avLst/>
+          </a:prstGeom>
+        </p:spPr>
+      </p:pic>
+      <p:pic>
+        <p:nvPicPr>
+          <p:cNvPr id="7" name="Picture 6">
+            <a:extLst>
+              <a:ext uri="{FF2B5EF4-FFF2-40B4-BE49-F238E27FC236}">
+                <a16:creationId xmlns:a16="http://schemas.microsoft.com/office/drawing/2014/main" id="{20D78053-8238-474C-9E8A-DAFEA2A3E57E}"/>
+              </a:ext>
+            </a:extLst>
+          </p:cNvPr>
+          <p:cNvPicPr>
+            <a:picLocks noChangeAspect="1"/>
+          </p:cNvPicPr>
+          <p:nvPr/>
+        </p:nvPicPr>
+        <p:blipFill>
+          <a:blip r:embed="rId3"/>
+          <a:stretch>
+            <a:fillRect/>
+          </a:stretch>
+        </p:blipFill>
+        <p:spPr>
+          <a:xfrm>
+            <a:off x="4080318" y="4633166"/>
+            <a:ext cx="1790700" cy="1933575"/>
+          </a:xfrm>
+          <a:prstGeom prst="rect">
+            <a:avLst/>
+          </a:prstGeom>
+        </p:spPr>
+      </p:pic>
     </p:spTree>
     <p:extLst>
       <p:ext uri="{BB962C8B-B14F-4D97-AF65-F5344CB8AC3E}">
-        <p14:creationId xmlns:p14="http://schemas.microsoft.com/office/powerpoint/2010/main" val="4211904472"/>
+        <p14:creationId xmlns:p14="http://schemas.microsoft.com/office/powerpoint/2010/main" val="891826986"/>
       </p:ext>
     </p:extLst>
   </p:cSld>
@@ -6881,7 +7361,7 @@
           <p:cNvPr id="2" name="Title 1">
             <a:extLst>
               <a:ext uri="{FF2B5EF4-FFF2-40B4-BE49-F238E27FC236}">
-                <a16:creationId xmlns:a16="http://schemas.microsoft.com/office/drawing/2014/main" id="{99172343-CBFD-4DA1-8240-173467B0E5D1}"/>
+                <a16:creationId xmlns:a16="http://schemas.microsoft.com/office/drawing/2014/main" id="{D99928D2-3943-4923-B91D-2B64861710A0}"/>
               </a:ext>
             </a:extLst>
           </p:cNvPr>
@@ -6899,7 +7379,7 @@
           <a:p>
             <a:r>
               <a:rPr lang="en-US" dirty="0"/>
-              <a:t>How big of budget do I need?</a:t>
+              <a:t>What can of things can the Overlords do?</a:t>
             </a:r>
           </a:p>
         </p:txBody>
@@ -6909,7 +7389,7 @@
           <p:cNvPr id="3" name="Content Placeholder 2">
             <a:extLst>
               <a:ext uri="{FF2B5EF4-FFF2-40B4-BE49-F238E27FC236}">
-                <a16:creationId xmlns:a16="http://schemas.microsoft.com/office/drawing/2014/main" id="{46CD42C3-9D1A-46EB-991D-0C75907316B1}"/>
+                <a16:creationId xmlns:a16="http://schemas.microsoft.com/office/drawing/2014/main" id="{330C8428-34EE-40B8-BFAF-DAAB7EFEB228}"/>
               </a:ext>
             </a:extLst>
           </p:cNvPr>
@@ -6920,34 +7400,62 @@
             <p:ph idx="1"/>
           </p:nvPr>
         </p:nvSpPr>
-        <p:spPr/>
-        <p:txBody>
-          <a:bodyPr/>
-          <a:lstStyle/>
-          <a:p>
-            <a:r>
-              <a:rPr lang="en-US" dirty="0"/>
-              <a:t>Go over costs to recognize</a:t>
-            </a:r>
-          </a:p>
-          <a:p>
-            <a:r>
-              <a:rPr lang="en-US" dirty="0"/>
-              <a:t>The storage space</a:t>
-            </a:r>
-          </a:p>
-          <a:p>
-            <a:r>
-              <a:rPr lang="en-US" dirty="0"/>
-              <a:t>And 10,000 people in a group, 1000000 photos.</a:t>
-            </a:r>
-          </a:p>
-        </p:txBody>
-      </p:sp>
+        <p:spPr>
+          <a:xfrm>
+            <a:off x="3629866" y="1285155"/>
+            <a:ext cx="2691604" cy="732725"/>
+          </a:xfrm>
+        </p:spPr>
+        <p:txBody>
+          <a:bodyPr>
+            <a:noAutofit/>
+          </a:bodyPr>
+          <a:lstStyle/>
+          <a:p>
+            <a:pPr marL="0" indent="0">
+              <a:buNone/>
+            </a:pPr>
+            <a:r>
+              <a:rPr lang="en-US" sz="3600" dirty="0"/>
+              <a:t>Recognition</a:t>
+            </a:r>
+          </a:p>
+        </p:txBody>
+      </p:sp>
+      <p:pic>
+        <p:nvPicPr>
+          <p:cNvPr id="5" name="Picture 4">
+            <a:extLst>
+              <a:ext uri="{FF2B5EF4-FFF2-40B4-BE49-F238E27FC236}">
+                <a16:creationId xmlns:a16="http://schemas.microsoft.com/office/drawing/2014/main" id="{25892C94-1E22-4D2E-AAB5-7A11811D5C94}"/>
+              </a:ext>
+            </a:extLst>
+          </p:cNvPr>
+          <p:cNvPicPr>
+            <a:picLocks noChangeAspect="1"/>
+          </p:cNvPicPr>
+          <p:nvPr/>
+        </p:nvPicPr>
+        <p:blipFill>
+          <a:blip r:embed="rId2"/>
+          <a:stretch>
+            <a:fillRect/>
+          </a:stretch>
+        </p:blipFill>
+        <p:spPr>
+          <a:xfrm>
+            <a:off x="2272988" y="1932868"/>
+            <a:ext cx="5405360" cy="4925132"/>
+          </a:xfrm>
+          <a:prstGeom prst="rect">
+            <a:avLst/>
+          </a:prstGeom>
+        </p:spPr>
+      </p:pic>
     </p:spTree>
     <p:extLst>
       <p:ext uri="{BB962C8B-B14F-4D97-AF65-F5344CB8AC3E}">
-        <p14:creationId xmlns:p14="http://schemas.microsoft.com/office/powerpoint/2010/main" val="2731125121"/>
+        <p14:creationId xmlns:p14="http://schemas.microsoft.com/office/powerpoint/2010/main" val="1834772668"/>
       </p:ext>
     </p:extLst>
   </p:cSld>
@@ -6979,7 +7487,7 @@
           <p:cNvPr id="2" name="Title 1">
             <a:extLst>
               <a:ext uri="{FF2B5EF4-FFF2-40B4-BE49-F238E27FC236}">
-                <a16:creationId xmlns:a16="http://schemas.microsoft.com/office/drawing/2014/main" id="{F4404C3F-FE5D-4E7D-ABD4-165D7238D802}"/>
+                <a16:creationId xmlns:a16="http://schemas.microsoft.com/office/drawing/2014/main" id="{169051D7-593E-4754-9C3B-844451951B58}"/>
               </a:ext>
             </a:extLst>
           </p:cNvPr>
@@ -6990,59 +7498,57 @@
             <p:ph type="title"/>
           </p:nvPr>
         </p:nvSpPr>
-        <p:spPr/>
+        <p:spPr>
+          <a:xfrm>
+            <a:off x="354562" y="495376"/>
+            <a:ext cx="8596668" cy="1320800"/>
+          </a:xfrm>
+        </p:spPr>
         <p:txBody>
           <a:bodyPr/>
           <a:lstStyle/>
           <a:p>
             <a:r>
               <a:rPr lang="en-US" dirty="0"/>
-              <a:t>You sold me, so how to get started!</a:t>
-            </a:r>
-          </a:p>
-        </p:txBody>
-      </p:sp>
-      <p:sp>
-        <p:nvSpPr>
-          <p:cNvPr id="3" name="Content Placeholder 2">
+              <a:t>What really are they tracking?</a:t>
+            </a:r>
+          </a:p>
+        </p:txBody>
+      </p:sp>
+      <p:pic>
+        <p:nvPicPr>
+          <p:cNvPr id="7" name="Picture 6">
             <a:extLst>
               <a:ext uri="{FF2B5EF4-FFF2-40B4-BE49-F238E27FC236}">
-                <a16:creationId xmlns:a16="http://schemas.microsoft.com/office/drawing/2014/main" id="{5749BDC7-1332-4143-9AF8-D0C420ADC9AD}"/>
+                <a16:creationId xmlns:a16="http://schemas.microsoft.com/office/drawing/2014/main" id="{C9B2DAFB-911A-4CCE-A7F1-0AC2707E1F78}"/>
               </a:ext>
             </a:extLst>
           </p:cNvPr>
-          <p:cNvSpPr>
-            <a:spLocks noGrp="1"/>
-          </p:cNvSpPr>
-          <p:nvPr>
-            <p:ph idx="1"/>
-          </p:nvPr>
-        </p:nvSpPr>
-        <p:spPr/>
-        <p:txBody>
-          <a:bodyPr/>
-          <a:lstStyle/>
-          <a:p>
-            <a:r>
-              <a:rPr lang="en-US" dirty="0"/>
-              <a:t>Azure</a:t>
-            </a:r>
-          </a:p>
-          <a:p>
-            <a:r>
-              <a:rPr lang="en-US" dirty="0"/>
-              <a:t>Then follow through the steps on the detect and recognize….</a:t>
-            </a:r>
-          </a:p>
-          <a:p>
-            <a:endParaRPr lang="en-US" dirty="0"/>
-          </a:p>
-        </p:txBody>
-      </p:sp>
+          <p:cNvPicPr>
+            <a:picLocks noChangeAspect="1"/>
+          </p:cNvPicPr>
+          <p:nvPr/>
+        </p:nvPicPr>
+        <p:blipFill>
+          <a:blip r:embed="rId2"/>
+          <a:stretch>
+            <a:fillRect/>
+          </a:stretch>
+        </p:blipFill>
+        <p:spPr>
+          <a:xfrm>
+            <a:off x="354562" y="1155776"/>
+            <a:ext cx="8596667" cy="5702224"/>
+          </a:xfrm>
+          <a:prstGeom prst="rect">
+            <a:avLst/>
+          </a:prstGeom>
+        </p:spPr>
+      </p:pic>
     </p:spTree>
     <p:extLst>
       <p:ext uri="{BB962C8B-B14F-4D97-AF65-F5344CB8AC3E}">
-        <p14:creationId xmlns:p14="http://schemas.microsoft.com/office/powerpoint/2010/main" val="3422128026"/>
+        <p14:creationId xmlns:p14="http://schemas.microsoft.com/office/powerpoint/2010/main" val="840592331"/>
       </p:ext>
     </p:extLst>
   </p:cSld>
@@ -7074,7 +7580,7 @@
           <p:cNvPr id="2" name="Title 1">
             <a:extLst>
               <a:ext uri="{FF2B5EF4-FFF2-40B4-BE49-F238E27FC236}">
-                <a16:creationId xmlns:a16="http://schemas.microsoft.com/office/drawing/2014/main" id="{996EF56D-7AE3-495F-B423-0646A6864B3B}"/>
+                <a16:creationId xmlns:a16="http://schemas.microsoft.com/office/drawing/2014/main" id="{EBBB8782-3F3D-47EE-849B-408F0CC020F7}"/>
               </a:ext>
             </a:extLst>
           </p:cNvPr>
@@ -7092,40 +7598,45 @@
           <a:p>
             <a:r>
               <a:rPr lang="en-US" dirty="0"/>
-              <a:t>Demos!!!!!!!</a:t>
-            </a:r>
-          </a:p>
-        </p:txBody>
-      </p:sp>
-      <p:sp>
-        <p:nvSpPr>
-          <p:cNvPr id="3" name="Content Placeholder 2">
+              <a:t>What types of info can they detect</a:t>
+            </a:r>
+          </a:p>
+        </p:txBody>
+      </p:sp>
+      <p:pic>
+        <p:nvPicPr>
+          <p:cNvPr id="6" name="Picture 5">
             <a:extLst>
               <a:ext uri="{FF2B5EF4-FFF2-40B4-BE49-F238E27FC236}">
-                <a16:creationId xmlns:a16="http://schemas.microsoft.com/office/drawing/2014/main" id="{571BA0E3-97E8-4BEC-9ECC-0C9AC85A3E74}"/>
+                <a16:creationId xmlns:a16="http://schemas.microsoft.com/office/drawing/2014/main" id="{2E261715-0500-48D2-8A73-CA915C6EE466}"/>
               </a:ext>
             </a:extLst>
           </p:cNvPr>
-          <p:cNvSpPr>
-            <a:spLocks noGrp="1"/>
-          </p:cNvSpPr>
-          <p:nvPr>
-            <p:ph idx="1"/>
-          </p:nvPr>
-        </p:nvSpPr>
-        <p:spPr/>
-        <p:txBody>
-          <a:bodyPr/>
-          <a:lstStyle/>
-          <a:p>
-            <a:endParaRPr lang="en-US"/>
-          </a:p>
-        </p:txBody>
-      </p:sp>
+          <p:cNvPicPr>
+            <a:picLocks noChangeAspect="1"/>
+          </p:cNvPicPr>
+          <p:nvPr/>
+        </p:nvPicPr>
+        <p:blipFill>
+          <a:blip r:embed="rId2"/>
+          <a:stretch>
+            <a:fillRect/>
+          </a:stretch>
+        </p:blipFill>
+        <p:spPr>
+          <a:xfrm>
+            <a:off x="1454797" y="1270000"/>
+            <a:ext cx="6177643" cy="5785600"/>
+          </a:xfrm>
+          <a:prstGeom prst="rect">
+            <a:avLst/>
+          </a:prstGeom>
+        </p:spPr>
+      </p:pic>
     </p:spTree>
     <p:extLst>
       <p:ext uri="{BB962C8B-B14F-4D97-AF65-F5344CB8AC3E}">
-        <p14:creationId xmlns:p14="http://schemas.microsoft.com/office/powerpoint/2010/main" val="2096994649"/>
+        <p14:creationId xmlns:p14="http://schemas.microsoft.com/office/powerpoint/2010/main" val="4211904472"/>
       </p:ext>
     </p:extLst>
   </p:cSld>

</xml_diff>